<commit_message>
MongoDb: Class1 ppt added
</commit_message>
<xml_diff>
--- a/Mongodb/MongoDb_Class1.pptx
+++ b/Mongodb/MongoDb_Class1.pptx
@@ -6,6 +6,14 @@
   </p:sldMasterIdLst>
   <p:sldIdLst>
     <p:sldId id="256" r:id="rId2"/>
+    <p:sldId id="257" r:id="rId3"/>
+    <p:sldId id="264" r:id="rId4"/>
+    <p:sldId id="258" r:id="rId5"/>
+    <p:sldId id="259" r:id="rId6"/>
+    <p:sldId id="260" r:id="rId7"/>
+    <p:sldId id="261" r:id="rId8"/>
+    <p:sldId id="262" r:id="rId9"/>
+    <p:sldId id="263" r:id="rId10"/>
   </p:sldIdLst>
   <p:sldSz cx="12192000" cy="6858000"/>
   <p:notesSz cx="6858000" cy="9144000"/>
@@ -7745,6 +7753,897 @@
 </p:sld>
 </file>
 
+<file path=ppt/slides/slide2.xml><?xml version="1.0" encoding="utf-8"?>
+<p:sld xmlns:a="http://schemas.openxmlformats.org/drawingml/2006/main" xmlns:r="http://schemas.openxmlformats.org/officeDocument/2006/relationships" xmlns:p="http://schemas.openxmlformats.org/presentationml/2006/main">
+  <p:cSld>
+    <p:spTree>
+      <p:nvGrpSpPr>
+        <p:cNvPr id="1" name=""/>
+        <p:cNvGrpSpPr/>
+        <p:nvPr/>
+      </p:nvGrpSpPr>
+      <p:grpSpPr>
+        <a:xfrm>
+          <a:off x="0" y="0"/>
+          <a:ext cx="0" cy="0"/>
+          <a:chOff x="0" y="0"/>
+          <a:chExt cx="0" cy="0"/>
+        </a:xfrm>
+      </p:grpSpPr>
+      <p:sp>
+        <p:nvSpPr>
+          <p:cNvPr id="2" name="Title 1"/>
+          <p:cNvSpPr>
+            <a:spLocks noGrp="1"/>
+          </p:cNvSpPr>
+          <p:nvPr>
+            <p:ph type="title"/>
+          </p:nvPr>
+        </p:nvSpPr>
+        <p:spPr/>
+        <p:txBody>
+          <a:bodyPr/>
+          <a:lstStyle/>
+          <a:p>
+            <a:r>
+              <a:rPr lang="en-US" dirty="0" smtClean="0"/>
+              <a:t>Agenda</a:t>
+            </a:r>
+            <a:endParaRPr lang="en-IN" dirty="0"/>
+          </a:p>
+        </p:txBody>
+      </p:sp>
+      <p:sp>
+        <p:nvSpPr>
+          <p:cNvPr id="3" name="Content Placeholder 2"/>
+          <p:cNvSpPr>
+            <a:spLocks noGrp="1"/>
+          </p:cNvSpPr>
+          <p:nvPr>
+            <p:ph idx="1"/>
+          </p:nvPr>
+        </p:nvSpPr>
+        <p:spPr/>
+        <p:txBody>
+          <a:bodyPr/>
+          <a:lstStyle/>
+          <a:p>
+            <a:r>
+              <a:rPr lang="en-US" dirty="0" smtClean="0"/>
+              <a:t>What is </a:t>
+            </a:r>
+            <a:r>
+              <a:rPr lang="en-US" dirty="0" err="1" smtClean="0"/>
+              <a:t>MongoDb</a:t>
+            </a:r>
+            <a:r>
+              <a:rPr lang="en-US" dirty="0" smtClean="0"/>
+              <a:t>?</a:t>
+            </a:r>
+          </a:p>
+          <a:p>
+            <a:r>
+              <a:rPr lang="en-US" dirty="0" smtClean="0"/>
+              <a:t>Core Fundamentals of </a:t>
+            </a:r>
+            <a:r>
+              <a:rPr lang="en-US" dirty="0" err="1" smtClean="0"/>
+              <a:t>MongoDb</a:t>
+            </a:r>
+            <a:endParaRPr lang="en-US" dirty="0" smtClean="0"/>
+          </a:p>
+          <a:p>
+            <a:r>
+              <a:rPr lang="en-US" dirty="0"/>
+              <a:t>What Is Meant By </a:t>
+            </a:r>
+            <a:r>
+              <a:rPr lang="en-US" dirty="0" smtClean="0"/>
+              <a:t>NoSQL?</a:t>
+            </a:r>
+            <a:endParaRPr lang="en-IN" dirty="0"/>
+          </a:p>
+        </p:txBody>
+      </p:sp>
+    </p:spTree>
+    <p:extLst>
+      <p:ext uri="{BB962C8B-B14F-4D97-AF65-F5344CB8AC3E}">
+        <p14:creationId xmlns:p14="http://schemas.microsoft.com/office/powerpoint/2010/main" val="3412216482"/>
+      </p:ext>
+    </p:extLst>
+  </p:cSld>
+  <p:clrMapOvr>
+    <a:masterClrMapping/>
+  </p:clrMapOvr>
+</p:sld>
+</file>
+
+<file path=ppt/slides/slide3.xml><?xml version="1.0" encoding="utf-8"?>
+<p:sld xmlns:a="http://schemas.openxmlformats.org/drawingml/2006/main" xmlns:r="http://schemas.openxmlformats.org/officeDocument/2006/relationships" xmlns:p="http://schemas.openxmlformats.org/presentationml/2006/main">
+  <p:cSld>
+    <p:spTree>
+      <p:nvGrpSpPr>
+        <p:cNvPr id="1" name=""/>
+        <p:cNvGrpSpPr/>
+        <p:nvPr/>
+      </p:nvGrpSpPr>
+      <p:grpSpPr>
+        <a:xfrm>
+          <a:off x="0" y="0"/>
+          <a:ext cx="0" cy="0"/>
+          <a:chOff x="0" y="0"/>
+          <a:chExt cx="0" cy="0"/>
+        </a:xfrm>
+      </p:grpSpPr>
+      <p:sp>
+        <p:nvSpPr>
+          <p:cNvPr id="2" name="Title 1"/>
+          <p:cNvSpPr>
+            <a:spLocks noGrp="1"/>
+          </p:cNvSpPr>
+          <p:nvPr>
+            <p:ph type="title"/>
+          </p:nvPr>
+        </p:nvSpPr>
+        <p:spPr/>
+        <p:txBody>
+          <a:bodyPr/>
+          <a:lstStyle/>
+          <a:p>
+            <a:r>
+              <a:rPr lang="en-US" dirty="0"/>
+              <a:t>What Is Meant By NoSQL?</a:t>
+            </a:r>
+            <a:endParaRPr lang="en-IN" dirty="0"/>
+          </a:p>
+        </p:txBody>
+      </p:sp>
+      <p:sp>
+        <p:nvSpPr>
+          <p:cNvPr id="3" name="Content Placeholder 2"/>
+          <p:cNvSpPr>
+            <a:spLocks noGrp="1"/>
+          </p:cNvSpPr>
+          <p:nvPr>
+            <p:ph idx="1"/>
+          </p:nvPr>
+        </p:nvSpPr>
+        <p:spPr/>
+        <p:txBody>
+          <a:bodyPr/>
+          <a:lstStyle/>
+          <a:p>
+            <a:r>
+              <a:rPr lang="en-US" dirty="0"/>
+              <a:t>A </a:t>
+            </a:r>
+            <a:r>
+              <a:rPr lang="en-US" b="1" dirty="0"/>
+              <a:t>NoSQL</a:t>
+            </a:r>
+            <a:r>
+              <a:rPr lang="en-US" dirty="0"/>
+              <a:t> originally referring to non SQL or non relational is a database that provides a mechanism for storage and retrieval of data. </a:t>
+            </a:r>
+            <a:endParaRPr lang="en-US" dirty="0" smtClean="0"/>
+          </a:p>
+          <a:p>
+            <a:r>
+              <a:rPr lang="en-US" dirty="0" smtClean="0"/>
+              <a:t>This </a:t>
+            </a:r>
+            <a:r>
+              <a:rPr lang="en-US" dirty="0"/>
+              <a:t>data is modeled in means other than the tabular relations used in relational databases. </a:t>
+            </a:r>
+            <a:endParaRPr lang="en-US" dirty="0" smtClean="0"/>
+          </a:p>
+          <a:p>
+            <a:r>
+              <a:rPr lang="en-US" dirty="0"/>
+              <a:t>The data structures used by NoSQL databases are different from those used by default in relational databases which makes some operations faster in NoSQL</a:t>
+            </a:r>
+            <a:endParaRPr lang="en-IN" dirty="0"/>
+          </a:p>
+        </p:txBody>
+      </p:sp>
+    </p:spTree>
+    <p:extLst>
+      <p:ext uri="{BB962C8B-B14F-4D97-AF65-F5344CB8AC3E}">
+        <p14:creationId xmlns:p14="http://schemas.microsoft.com/office/powerpoint/2010/main" val="3862365431"/>
+      </p:ext>
+    </p:extLst>
+  </p:cSld>
+  <p:clrMapOvr>
+    <a:masterClrMapping/>
+  </p:clrMapOvr>
+</p:sld>
+</file>
+
+<file path=ppt/slides/slide4.xml><?xml version="1.0" encoding="utf-8"?>
+<p:sld xmlns:a="http://schemas.openxmlformats.org/drawingml/2006/main" xmlns:r="http://schemas.openxmlformats.org/officeDocument/2006/relationships" xmlns:p="http://schemas.openxmlformats.org/presentationml/2006/main">
+  <p:cSld>
+    <p:spTree>
+      <p:nvGrpSpPr>
+        <p:cNvPr id="1" name=""/>
+        <p:cNvGrpSpPr/>
+        <p:nvPr/>
+      </p:nvGrpSpPr>
+      <p:grpSpPr>
+        <a:xfrm>
+          <a:off x="0" y="0"/>
+          <a:ext cx="0" cy="0"/>
+          <a:chOff x="0" y="0"/>
+          <a:chExt cx="0" cy="0"/>
+        </a:xfrm>
+      </p:grpSpPr>
+      <p:sp>
+        <p:nvSpPr>
+          <p:cNvPr id="2" name="Title 1"/>
+          <p:cNvSpPr>
+            <a:spLocks noGrp="1"/>
+          </p:cNvSpPr>
+          <p:nvPr>
+            <p:ph type="title"/>
+          </p:nvPr>
+        </p:nvSpPr>
+        <p:spPr/>
+        <p:txBody>
+          <a:bodyPr/>
+          <a:lstStyle/>
+          <a:p>
+            <a:r>
+              <a:rPr lang="en-US" dirty="0" smtClean="0"/>
+              <a:t>What is </a:t>
+            </a:r>
+            <a:r>
+              <a:rPr lang="en-US" dirty="0" err="1" smtClean="0"/>
+              <a:t>MongoDb</a:t>
+            </a:r>
+            <a:r>
+              <a:rPr lang="en-US" dirty="0" smtClean="0"/>
+              <a:t>?</a:t>
+            </a:r>
+            <a:endParaRPr lang="en-IN" dirty="0"/>
+          </a:p>
+        </p:txBody>
+      </p:sp>
+      <p:sp>
+        <p:nvSpPr>
+          <p:cNvPr id="3" name="Content Placeholder 2"/>
+          <p:cNvSpPr>
+            <a:spLocks noGrp="1"/>
+          </p:cNvSpPr>
+          <p:nvPr>
+            <p:ph idx="1"/>
+          </p:nvPr>
+        </p:nvSpPr>
+        <p:spPr/>
+        <p:txBody>
+          <a:bodyPr/>
+          <a:lstStyle/>
+          <a:p>
+            <a:r>
+              <a:rPr lang="en-US" dirty="0"/>
+              <a:t>MongoDB is a </a:t>
+            </a:r>
+            <a:r>
+              <a:rPr lang="en-US" dirty="0" smtClean="0"/>
+              <a:t>cross-platform</a:t>
+            </a:r>
+          </a:p>
+          <a:p>
+            <a:r>
+              <a:rPr lang="en-US" dirty="0" smtClean="0"/>
+              <a:t> </a:t>
+            </a:r>
+            <a:r>
+              <a:rPr lang="en-US" dirty="0"/>
+              <a:t>document oriented </a:t>
+            </a:r>
+            <a:r>
+              <a:rPr lang="en-US" dirty="0" smtClean="0"/>
+              <a:t>database. </a:t>
+            </a:r>
+          </a:p>
+          <a:p>
+            <a:r>
+              <a:rPr lang="en-US" dirty="0" smtClean="0"/>
+              <a:t>MongoDB </a:t>
+            </a:r>
+            <a:r>
+              <a:rPr lang="en-US" dirty="0"/>
+              <a:t>works on concept of collection and document</a:t>
+            </a:r>
+            <a:r>
+              <a:rPr lang="en-US" dirty="0" smtClean="0"/>
+              <a:t>.</a:t>
+            </a:r>
+          </a:p>
+          <a:p>
+            <a:r>
+              <a:rPr lang="en-US" dirty="0" smtClean="0"/>
+              <a:t>It</a:t>
+            </a:r>
+            <a:r>
+              <a:rPr lang="en-US" dirty="0"/>
+              <a:t> </a:t>
+            </a:r>
+            <a:r>
+              <a:rPr lang="en-US" dirty="0" smtClean="0"/>
+              <a:t>provides </a:t>
+            </a:r>
+            <a:r>
+              <a:rPr lang="en-US" dirty="0"/>
+              <a:t>high performance, high availability, and easy scalability</a:t>
+            </a:r>
+            <a:endParaRPr lang="en-IN" dirty="0"/>
+          </a:p>
+        </p:txBody>
+      </p:sp>
+    </p:spTree>
+    <p:extLst>
+      <p:ext uri="{BB962C8B-B14F-4D97-AF65-F5344CB8AC3E}">
+        <p14:creationId xmlns:p14="http://schemas.microsoft.com/office/powerpoint/2010/main" val="2550590008"/>
+      </p:ext>
+    </p:extLst>
+  </p:cSld>
+  <p:clrMapOvr>
+    <a:masterClrMapping/>
+  </p:clrMapOvr>
+</p:sld>
+</file>
+
+<file path=ppt/slides/slide5.xml><?xml version="1.0" encoding="utf-8"?>
+<p:sld xmlns:a="http://schemas.openxmlformats.org/drawingml/2006/main" xmlns:r="http://schemas.openxmlformats.org/officeDocument/2006/relationships" xmlns:p="http://schemas.openxmlformats.org/presentationml/2006/main">
+  <p:cSld>
+    <p:spTree>
+      <p:nvGrpSpPr>
+        <p:cNvPr id="1" name=""/>
+        <p:cNvGrpSpPr/>
+        <p:nvPr/>
+      </p:nvGrpSpPr>
+      <p:grpSpPr>
+        <a:xfrm>
+          <a:off x="0" y="0"/>
+          <a:ext cx="0" cy="0"/>
+          <a:chOff x="0" y="0"/>
+          <a:chExt cx="0" cy="0"/>
+        </a:xfrm>
+      </p:grpSpPr>
+      <p:sp>
+        <p:nvSpPr>
+          <p:cNvPr id="2" name="Title 1"/>
+          <p:cNvSpPr>
+            <a:spLocks noGrp="1"/>
+          </p:cNvSpPr>
+          <p:nvPr>
+            <p:ph type="title"/>
+          </p:nvPr>
+        </p:nvSpPr>
+        <p:spPr>
+          <a:xfrm>
+            <a:off x="2472852" y="180765"/>
+            <a:ext cx="8911687" cy="881416"/>
+          </a:xfrm>
+        </p:spPr>
+        <p:txBody>
+          <a:bodyPr/>
+          <a:lstStyle/>
+          <a:p>
+            <a:r>
+              <a:rPr lang="en-US" dirty="0"/>
+              <a:t>Core Fundamentals of </a:t>
+            </a:r>
+            <a:r>
+              <a:rPr lang="en-US" dirty="0" err="1" smtClean="0"/>
+              <a:t>MongoDb</a:t>
+            </a:r>
+            <a:endParaRPr lang="en-IN" dirty="0"/>
+          </a:p>
+        </p:txBody>
+      </p:sp>
+      <p:sp>
+        <p:nvSpPr>
+          <p:cNvPr id="3" name="Content Placeholder 2"/>
+          <p:cNvSpPr>
+            <a:spLocks noGrp="1"/>
+          </p:cNvSpPr>
+          <p:nvPr>
+            <p:ph idx="1"/>
+          </p:nvPr>
+        </p:nvSpPr>
+        <p:spPr>
+          <a:xfrm>
+            <a:off x="1560945" y="923636"/>
+            <a:ext cx="10390909" cy="5560291"/>
+          </a:xfrm>
+        </p:spPr>
+        <p:txBody>
+          <a:bodyPr>
+            <a:normAutofit fontScale="92500" lnSpcReduction="10000"/>
+          </a:bodyPr>
+          <a:lstStyle/>
+          <a:p>
+            <a:r>
+              <a:rPr lang="en-IN" dirty="0"/>
+              <a:t>Database</a:t>
+            </a:r>
+          </a:p>
+          <a:p>
+            <a:r>
+              <a:rPr lang="en-IN" dirty="0"/>
+              <a:t>Collection</a:t>
+            </a:r>
+          </a:p>
+          <a:p>
+            <a:r>
+              <a:rPr lang="en-IN" dirty="0" smtClean="0"/>
+              <a:t>Document</a:t>
+            </a:r>
+          </a:p>
+          <a:p>
+            <a:endParaRPr lang="en-US" dirty="0"/>
+          </a:p>
+          <a:p>
+            <a:pPr>
+              <a:buFont typeface="Wingdings" panose="05000000000000000000" pitchFamily="2" charset="2"/>
+              <a:buChar char="q"/>
+            </a:pPr>
+            <a:r>
+              <a:rPr lang="en-US" dirty="0" smtClean="0"/>
+              <a:t> Database:</a:t>
+            </a:r>
+          </a:p>
+          <a:p>
+            <a:pPr marL="0" indent="0">
+              <a:buNone/>
+            </a:pPr>
+            <a:r>
+              <a:rPr lang="en-US" dirty="0" smtClean="0"/>
+              <a:t>         Database </a:t>
+            </a:r>
+            <a:r>
+              <a:rPr lang="en-US" dirty="0"/>
+              <a:t>is a physical container for collections. Each database gets its own set of files on the file system. A single MongoDB server typically has multiple databases</a:t>
+            </a:r>
+            <a:r>
+              <a:rPr lang="en-US" dirty="0" smtClean="0"/>
+              <a:t>.</a:t>
+            </a:r>
+          </a:p>
+          <a:p>
+            <a:pPr marL="0" indent="0">
+              <a:buNone/>
+            </a:pPr>
+            <a:endParaRPr lang="en-US" dirty="0"/>
+          </a:p>
+          <a:p>
+            <a:pPr>
+              <a:buFont typeface="Wingdings" panose="05000000000000000000" pitchFamily="2" charset="2"/>
+              <a:buChar char="q"/>
+            </a:pPr>
+            <a:r>
+              <a:rPr lang="en-IN" dirty="0"/>
+              <a:t>Collection</a:t>
+            </a:r>
+          </a:p>
+          <a:p>
+            <a:pPr marL="0" indent="0">
+              <a:buNone/>
+            </a:pPr>
+            <a:r>
+              <a:rPr lang="en-US" dirty="0"/>
+              <a:t>Collection is a group of MongoDB documents. It is the equivalent of an RDBMS table. A collection exists within a single database. Collections do not enforce a schema. Documents within a collection can have different fields. Typically, all documents in a collection are of similar or related purpose</a:t>
+            </a:r>
+            <a:r>
+              <a:rPr lang="en-US" dirty="0" smtClean="0"/>
+              <a:t>.</a:t>
+            </a:r>
+          </a:p>
+          <a:p>
+            <a:pPr marL="0" indent="0">
+              <a:buNone/>
+            </a:pPr>
+            <a:endParaRPr lang="en-US" dirty="0" smtClean="0"/>
+          </a:p>
+          <a:p>
+            <a:pPr>
+              <a:buFont typeface="Wingdings" panose="05000000000000000000" pitchFamily="2" charset="2"/>
+              <a:buChar char="q"/>
+            </a:pPr>
+            <a:r>
+              <a:rPr lang="en-US" dirty="0" smtClean="0"/>
+              <a:t>Document</a:t>
+            </a:r>
+            <a:endParaRPr lang="en-US" dirty="0"/>
+          </a:p>
+          <a:p>
+            <a:pPr marL="0" indent="0">
+              <a:buNone/>
+            </a:pPr>
+            <a:r>
+              <a:rPr lang="en-US" dirty="0"/>
+              <a:t>A document is a set of key-value pairs. Documents have dynamic schema. Dynamic schema means that documents in the same collection do not need to have the same set of fields or structure, and common fields in a collection's documents may hold different types of data.</a:t>
+            </a:r>
+          </a:p>
+          <a:p>
+            <a:pPr marL="0" indent="0">
+              <a:buNone/>
+            </a:pPr>
+            <a:endParaRPr lang="en-US" dirty="0" smtClean="0"/>
+          </a:p>
+          <a:p>
+            <a:pPr marL="0" indent="0">
+              <a:buNone/>
+            </a:pPr>
+            <a:endParaRPr lang="en-US" dirty="0"/>
+          </a:p>
+          <a:p>
+            <a:pPr marL="0" indent="0">
+              <a:buNone/>
+            </a:pPr>
+            <a:endParaRPr lang="en-US" dirty="0" smtClean="0"/>
+          </a:p>
+          <a:p>
+            <a:pPr marL="0" indent="0">
+              <a:buNone/>
+            </a:pPr>
+            <a:endParaRPr lang="en-US" dirty="0"/>
+          </a:p>
+          <a:p>
+            <a:pPr>
+              <a:buFont typeface="Wingdings" panose="05000000000000000000" pitchFamily="2" charset="2"/>
+              <a:buChar char="Ø"/>
+            </a:pPr>
+            <a:endParaRPr lang="en-IN" dirty="0"/>
+          </a:p>
+          <a:p>
+            <a:pPr marL="0" indent="0">
+              <a:buNone/>
+            </a:pPr>
+            <a:endParaRPr lang="en-IN" dirty="0"/>
+          </a:p>
+        </p:txBody>
+      </p:sp>
+    </p:spTree>
+    <p:extLst>
+      <p:ext uri="{BB962C8B-B14F-4D97-AF65-F5344CB8AC3E}">
+        <p14:creationId xmlns:p14="http://schemas.microsoft.com/office/powerpoint/2010/main" val="517409212"/>
+      </p:ext>
+    </p:extLst>
+  </p:cSld>
+  <p:clrMapOvr>
+    <a:masterClrMapping/>
+  </p:clrMapOvr>
+</p:sld>
+</file>
+
+<file path=ppt/slides/slide6.xml><?xml version="1.0" encoding="utf-8"?>
+<p:sld xmlns:a="http://schemas.openxmlformats.org/drawingml/2006/main" xmlns:r="http://schemas.openxmlformats.org/officeDocument/2006/relationships" xmlns:p="http://schemas.openxmlformats.org/presentationml/2006/main">
+  <p:cSld>
+    <p:spTree>
+      <p:nvGrpSpPr>
+        <p:cNvPr id="1" name=""/>
+        <p:cNvGrpSpPr/>
+        <p:nvPr/>
+      </p:nvGrpSpPr>
+      <p:grpSpPr>
+        <a:xfrm>
+          <a:off x="0" y="0"/>
+          <a:ext cx="0" cy="0"/>
+          <a:chOff x="0" y="0"/>
+          <a:chExt cx="0" cy="0"/>
+        </a:xfrm>
+      </p:grpSpPr>
+      <p:pic>
+        <p:nvPicPr>
+          <p:cNvPr id="4" name="Picture 3"/>
+          <p:cNvPicPr>
+            <a:picLocks noChangeAspect="1"/>
+          </p:cNvPicPr>
+          <p:nvPr/>
+        </p:nvPicPr>
+        <p:blipFill>
+          <a:blip r:embed="rId2"/>
+          <a:stretch>
+            <a:fillRect/>
+          </a:stretch>
+        </p:blipFill>
+        <p:spPr>
+          <a:xfrm>
+            <a:off x="334684" y="507999"/>
+            <a:ext cx="11857316" cy="5971310"/>
+          </a:xfrm>
+          <a:prstGeom prst="rect">
+            <a:avLst/>
+          </a:prstGeom>
+        </p:spPr>
+      </p:pic>
+    </p:spTree>
+    <p:extLst>
+      <p:ext uri="{BB962C8B-B14F-4D97-AF65-F5344CB8AC3E}">
+        <p14:creationId xmlns:p14="http://schemas.microsoft.com/office/powerpoint/2010/main" val="1489522015"/>
+      </p:ext>
+    </p:extLst>
+  </p:cSld>
+  <p:clrMapOvr>
+    <a:masterClrMapping/>
+  </p:clrMapOvr>
+</p:sld>
+</file>
+
+<file path=ppt/slides/slide7.xml><?xml version="1.0" encoding="utf-8"?>
+<p:sld xmlns:a="http://schemas.openxmlformats.org/drawingml/2006/main" xmlns:r="http://schemas.openxmlformats.org/officeDocument/2006/relationships" xmlns:p="http://schemas.openxmlformats.org/presentationml/2006/main">
+  <p:cSld>
+    <p:spTree>
+      <p:nvGrpSpPr>
+        <p:cNvPr id="1" name=""/>
+        <p:cNvGrpSpPr/>
+        <p:nvPr/>
+      </p:nvGrpSpPr>
+      <p:grpSpPr>
+        <a:xfrm>
+          <a:off x="0" y="0"/>
+          <a:ext cx="0" cy="0"/>
+          <a:chOff x="0" y="0"/>
+          <a:chExt cx="0" cy="0"/>
+        </a:xfrm>
+      </p:grpSpPr>
+      <p:sp>
+        <p:nvSpPr>
+          <p:cNvPr id="2" name="Title 1"/>
+          <p:cNvSpPr>
+            <a:spLocks noGrp="1"/>
+          </p:cNvSpPr>
+          <p:nvPr>
+            <p:ph type="title"/>
+          </p:nvPr>
+        </p:nvSpPr>
+        <p:spPr/>
+        <p:txBody>
+          <a:bodyPr/>
+          <a:lstStyle/>
+          <a:p>
+            <a:r>
+              <a:rPr lang="en-US" dirty="0"/>
+              <a:t>R</a:t>
+            </a:r>
+            <a:r>
+              <a:rPr lang="en-US" dirty="0" smtClean="0"/>
+              <a:t>elationship </a:t>
+            </a:r>
+            <a:r>
+              <a:rPr lang="en-US" dirty="0"/>
+              <a:t>of RDBMS terminology with MongoDB.</a:t>
+            </a:r>
+            <a:endParaRPr lang="en-IN" dirty="0"/>
+          </a:p>
+        </p:txBody>
+      </p:sp>
+      <p:pic>
+        <p:nvPicPr>
+          <p:cNvPr id="4" name="Content Placeholder 3"/>
+          <p:cNvPicPr>
+            <a:picLocks noGrp="1" noChangeAspect="1"/>
+          </p:cNvPicPr>
+          <p:nvPr>
+            <p:ph idx="1"/>
+          </p:nvPr>
+        </p:nvPicPr>
+        <p:blipFill>
+          <a:blip r:embed="rId2"/>
+          <a:stretch>
+            <a:fillRect/>
+          </a:stretch>
+        </p:blipFill>
+        <p:spPr>
+          <a:xfrm>
+            <a:off x="2592925" y="2134177"/>
+            <a:ext cx="8644652" cy="4312806"/>
+          </a:xfrm>
+          <a:prstGeom prst="rect">
+            <a:avLst/>
+          </a:prstGeom>
+        </p:spPr>
+      </p:pic>
+    </p:spTree>
+    <p:extLst>
+      <p:ext uri="{BB962C8B-B14F-4D97-AF65-F5344CB8AC3E}">
+        <p14:creationId xmlns:p14="http://schemas.microsoft.com/office/powerpoint/2010/main" val="136249730"/>
+      </p:ext>
+    </p:extLst>
+  </p:cSld>
+  <p:clrMapOvr>
+    <a:masterClrMapping/>
+  </p:clrMapOvr>
+</p:sld>
+</file>
+
+<file path=ppt/slides/slide8.xml><?xml version="1.0" encoding="utf-8"?>
+<p:sld xmlns:a="http://schemas.openxmlformats.org/drawingml/2006/main" xmlns:r="http://schemas.openxmlformats.org/officeDocument/2006/relationships" xmlns:p="http://schemas.openxmlformats.org/presentationml/2006/main">
+  <p:cSld>
+    <p:spTree>
+      <p:nvGrpSpPr>
+        <p:cNvPr id="1" name=""/>
+        <p:cNvGrpSpPr/>
+        <p:nvPr/>
+      </p:nvGrpSpPr>
+      <p:grpSpPr>
+        <a:xfrm>
+          <a:off x="0" y="0"/>
+          <a:ext cx="0" cy="0"/>
+          <a:chOff x="0" y="0"/>
+          <a:chExt cx="0" cy="0"/>
+        </a:xfrm>
+      </p:grpSpPr>
+      <p:sp>
+        <p:nvSpPr>
+          <p:cNvPr id="2" name="Title 1"/>
+          <p:cNvSpPr>
+            <a:spLocks noGrp="1"/>
+          </p:cNvSpPr>
+          <p:nvPr>
+            <p:ph type="title"/>
+          </p:nvPr>
+        </p:nvSpPr>
+        <p:spPr/>
+        <p:txBody>
+          <a:bodyPr/>
+          <a:lstStyle/>
+          <a:p>
+            <a:r>
+              <a:rPr lang="en-IN" dirty="0"/>
+              <a:t>Sample Document</a:t>
+            </a:r>
+            <a:br>
+              <a:rPr lang="en-IN" dirty="0"/>
+            </a:br>
+            <a:endParaRPr lang="en-IN" dirty="0"/>
+          </a:p>
+        </p:txBody>
+      </p:sp>
+      <p:pic>
+        <p:nvPicPr>
+          <p:cNvPr id="4" name="Content Placeholder 3"/>
+          <p:cNvPicPr>
+            <a:picLocks noGrp="1" noChangeAspect="1"/>
+          </p:cNvPicPr>
+          <p:nvPr>
+            <p:ph idx="1"/>
+          </p:nvPr>
+        </p:nvPicPr>
+        <p:blipFill>
+          <a:blip r:embed="rId2"/>
+          <a:stretch>
+            <a:fillRect/>
+          </a:stretch>
+        </p:blipFill>
+        <p:spPr>
+          <a:xfrm>
+            <a:off x="2592925" y="1334336"/>
+            <a:ext cx="7831570" cy="5523664"/>
+          </a:xfrm>
+          <a:prstGeom prst="rect">
+            <a:avLst/>
+          </a:prstGeom>
+        </p:spPr>
+      </p:pic>
+    </p:spTree>
+    <p:extLst>
+      <p:ext uri="{BB962C8B-B14F-4D97-AF65-F5344CB8AC3E}">
+        <p14:creationId xmlns:p14="http://schemas.microsoft.com/office/powerpoint/2010/main" val="1484600733"/>
+      </p:ext>
+    </p:extLst>
+  </p:cSld>
+  <p:clrMapOvr>
+    <a:masterClrMapping/>
+  </p:clrMapOvr>
+</p:sld>
+</file>
+
+<file path=ppt/slides/slide9.xml><?xml version="1.0" encoding="utf-8"?>
+<p:sld xmlns:a="http://schemas.openxmlformats.org/drawingml/2006/main" xmlns:r="http://schemas.openxmlformats.org/officeDocument/2006/relationships" xmlns:p="http://schemas.openxmlformats.org/presentationml/2006/main">
+  <p:cSld>
+    <p:spTree>
+      <p:nvGrpSpPr>
+        <p:cNvPr id="1" name=""/>
+        <p:cNvGrpSpPr/>
+        <p:nvPr/>
+      </p:nvGrpSpPr>
+      <p:grpSpPr>
+        <a:xfrm>
+          <a:off x="0" y="0"/>
+          <a:ext cx="0" cy="0"/>
+          <a:chOff x="0" y="0"/>
+          <a:chExt cx="0" cy="0"/>
+        </a:xfrm>
+      </p:grpSpPr>
+      <p:sp>
+        <p:nvSpPr>
+          <p:cNvPr id="2" name="Title 1"/>
+          <p:cNvSpPr>
+            <a:spLocks noGrp="1"/>
+          </p:cNvSpPr>
+          <p:nvPr>
+            <p:ph type="title"/>
+          </p:nvPr>
+        </p:nvSpPr>
+        <p:spPr/>
+        <p:txBody>
+          <a:bodyPr/>
+          <a:lstStyle/>
+          <a:p>
+            <a:r>
+              <a:rPr lang="en-US" dirty="0" smtClean="0"/>
+              <a:t>References</a:t>
+            </a:r>
+            <a:endParaRPr lang="en-IN" dirty="0"/>
+          </a:p>
+        </p:txBody>
+      </p:sp>
+      <p:sp>
+        <p:nvSpPr>
+          <p:cNvPr id="3" name="Content Placeholder 2"/>
+          <p:cNvSpPr>
+            <a:spLocks noGrp="1"/>
+          </p:cNvSpPr>
+          <p:nvPr>
+            <p:ph idx="1"/>
+          </p:nvPr>
+        </p:nvSpPr>
+        <p:spPr/>
+        <p:txBody>
+          <a:bodyPr/>
+          <a:lstStyle/>
+          <a:p>
+            <a:r>
+              <a:rPr lang="en-IN" dirty="0">
+                <a:hlinkClick r:id="rId2"/>
+              </a:rPr>
+              <a:t>https://</a:t>
+            </a:r>
+            <a:r>
+              <a:rPr lang="en-IN" dirty="0" smtClean="0">
+                <a:hlinkClick r:id="rId2"/>
+              </a:rPr>
+              <a:t>www.tutorialspoint.com/mongodb/index.htm</a:t>
+            </a:r>
+            <a:endParaRPr lang="en-IN" dirty="0" smtClean="0"/>
+          </a:p>
+          <a:p>
+            <a:r>
+              <a:rPr lang="en-IN" dirty="0">
+                <a:hlinkClick r:id="rId3"/>
+              </a:rPr>
+              <a:t>https://docs.mongodb.com/manual/introduction</a:t>
+            </a:r>
+            <a:r>
+              <a:rPr lang="en-IN" dirty="0" smtClean="0">
+                <a:hlinkClick r:id="rId3"/>
+              </a:rPr>
+              <a:t>/</a:t>
+            </a:r>
+            <a:endParaRPr lang="en-IN" dirty="0" smtClean="0"/>
+          </a:p>
+          <a:p>
+            <a:endParaRPr lang="en-IN" dirty="0"/>
+          </a:p>
+        </p:txBody>
+      </p:sp>
+    </p:spTree>
+    <p:extLst>
+      <p:ext uri="{BB962C8B-B14F-4D97-AF65-F5344CB8AC3E}">
+        <p14:creationId xmlns:p14="http://schemas.microsoft.com/office/powerpoint/2010/main" val="2323719451"/>
+      </p:ext>
+    </p:extLst>
+  </p:cSld>
+  <p:clrMapOvr>
+    <a:masterClrMapping/>
+  </p:clrMapOvr>
+</p:sld>
+</file>
+
 <file path=ppt/theme/theme1.xml><?xml version="1.0" encoding="utf-8"?>
 <a:theme xmlns:a="http://schemas.openxmlformats.org/drawingml/2006/main" name="Wisp">
   <a:themeElements>

</xml_diff>

<commit_message>
MongoDb: Installation steps added in ppt
</commit_message>
<xml_diff>
--- a/Mongodb/MongoDb_Class1.pptx
+++ b/Mongodb/MongoDb_Class1.pptx
@@ -13,7 +13,8 @@
     <p:sldId id="260" r:id="rId7"/>
     <p:sldId id="261" r:id="rId8"/>
     <p:sldId id="262" r:id="rId9"/>
-    <p:sldId id="263" r:id="rId10"/>
+    <p:sldId id="265" r:id="rId10"/>
+    <p:sldId id="263" r:id="rId11"/>
   </p:sldIdLst>
   <p:sldSz cx="12192000" cy="6858000"/>
   <p:notesSz cx="6858000" cy="9144000"/>
@@ -112,6 +113,11 @@
       </a:defRPr>
     </a:lvl9pPr>
   </p:defaultTextStyle>
+  <p:extLst>
+    <p:ext uri="{EFAFB233-063F-42B5-8137-9DF3F51BA10A}">
+      <p15:sldGuideLst xmlns:p15="http://schemas.microsoft.com/office/powerpoint/2012/main"/>
+    </p:ext>
+  </p:extLst>
 </p:presentation>
 </file>
 
@@ -303,7 +309,7 @@
           <a:p>
             <a:fld id="{88EC1668-57D9-433B-B282-7BE283FD0F28}" type="datetimeFigureOut">
               <a:rPr lang="en-IN" smtClean="0"/>
-              <a:t>12-01-2022</a:t>
+              <a:t>17-01-2022</a:t>
             </a:fld>
             <a:endParaRPr lang="en-IN"/>
           </a:p>
@@ -641,7 +647,7 @@
           <a:p>
             <a:fld id="{88EC1668-57D9-433B-B282-7BE283FD0F28}" type="datetimeFigureOut">
               <a:rPr lang="en-IN" smtClean="0"/>
-              <a:t>12-01-2022</a:t>
+              <a:t>17-01-2022</a:t>
             </a:fld>
             <a:endParaRPr lang="en-IN"/>
           </a:p>
@@ -1042,7 +1048,7 @@
           <a:p>
             <a:fld id="{88EC1668-57D9-433B-B282-7BE283FD0F28}" type="datetimeFigureOut">
               <a:rPr lang="en-IN" smtClean="0"/>
-              <a:t>12-01-2022</a:t>
+              <a:t>17-01-2022</a:t>
             </a:fld>
             <a:endParaRPr lang="en-IN"/>
           </a:p>
@@ -1378,7 +1384,7 @@
           <a:p>
             <a:fld id="{88EC1668-57D9-433B-B282-7BE283FD0F28}" type="datetimeFigureOut">
               <a:rPr lang="en-IN" smtClean="0"/>
-              <a:t>12-01-2022</a:t>
+              <a:t>17-01-2022</a:t>
             </a:fld>
             <a:endParaRPr lang="en-IN"/>
           </a:p>
@@ -1698,7 +1704,7 @@
           <a:p>
             <a:fld id="{88EC1668-57D9-433B-B282-7BE283FD0F28}" type="datetimeFigureOut">
               <a:rPr lang="en-IN" smtClean="0"/>
-              <a:t>12-01-2022</a:t>
+              <a:t>17-01-2022</a:t>
             </a:fld>
             <a:endParaRPr lang="en-IN"/>
           </a:p>
@@ -2094,7 +2100,7 @@
           <a:p>
             <a:fld id="{88EC1668-57D9-433B-B282-7BE283FD0F28}" type="datetimeFigureOut">
               <a:rPr lang="en-IN" smtClean="0"/>
-              <a:t>12-01-2022</a:t>
+              <a:t>17-01-2022</a:t>
             </a:fld>
             <a:endParaRPr lang="en-IN"/>
           </a:p>
@@ -2351,7 +2357,7 @@
           <a:p>
             <a:fld id="{88EC1668-57D9-433B-B282-7BE283FD0F28}" type="datetimeFigureOut">
               <a:rPr lang="en-IN" smtClean="0"/>
-              <a:t>12-01-2022</a:t>
+              <a:t>17-01-2022</a:t>
             </a:fld>
             <a:endParaRPr lang="en-IN"/>
           </a:p>
@@ -2613,7 +2619,7 @@
           <a:p>
             <a:fld id="{88EC1668-57D9-433B-B282-7BE283FD0F28}" type="datetimeFigureOut">
               <a:rPr lang="en-IN" smtClean="0"/>
-              <a:t>12-01-2022</a:t>
+              <a:t>17-01-2022</a:t>
             </a:fld>
             <a:endParaRPr lang="en-IN"/>
           </a:p>
@@ -2875,7 +2881,7 @@
           <a:p>
             <a:fld id="{88EC1668-57D9-433B-B282-7BE283FD0F28}" type="datetimeFigureOut">
               <a:rPr lang="en-IN" smtClean="0"/>
-              <a:t>12-01-2022</a:t>
+              <a:t>17-01-2022</a:t>
             </a:fld>
             <a:endParaRPr lang="en-IN"/>
           </a:p>
@@ -3204,7 +3210,7 @@
           <a:p>
             <a:fld id="{88EC1668-57D9-433B-B282-7BE283FD0F28}" type="datetimeFigureOut">
               <a:rPr lang="en-IN" smtClean="0"/>
-              <a:t>12-01-2022</a:t>
+              <a:t>17-01-2022</a:t>
             </a:fld>
             <a:endParaRPr lang="en-IN"/>
           </a:p>
@@ -3527,7 +3533,7 @@
           <a:p>
             <a:fld id="{88EC1668-57D9-433B-B282-7BE283FD0F28}" type="datetimeFigureOut">
               <a:rPr lang="en-IN" smtClean="0"/>
-              <a:t>12-01-2022</a:t>
+              <a:t>17-01-2022</a:t>
             </a:fld>
             <a:endParaRPr lang="en-IN"/>
           </a:p>
@@ -3984,7 +3990,7 @@
           <a:p>
             <a:fld id="{88EC1668-57D9-433B-B282-7BE283FD0F28}" type="datetimeFigureOut">
               <a:rPr lang="en-IN" smtClean="0"/>
-              <a:t>12-01-2022</a:t>
+              <a:t>17-01-2022</a:t>
             </a:fld>
             <a:endParaRPr lang="en-IN"/>
           </a:p>
@@ -4189,7 +4195,7 @@
           <a:p>
             <a:fld id="{88EC1668-57D9-433B-B282-7BE283FD0F28}" type="datetimeFigureOut">
               <a:rPr lang="en-IN" smtClean="0"/>
-              <a:t>12-01-2022</a:t>
+              <a:t>17-01-2022</a:t>
             </a:fld>
             <a:endParaRPr lang="en-IN"/>
           </a:p>
@@ -4366,7 +4372,7 @@
           <a:p>
             <a:fld id="{88EC1668-57D9-433B-B282-7BE283FD0F28}" type="datetimeFigureOut">
               <a:rPr lang="en-IN" smtClean="0"/>
-              <a:t>12-01-2022</a:t>
+              <a:t>17-01-2022</a:t>
             </a:fld>
             <a:endParaRPr lang="en-IN"/>
           </a:p>
@@ -4699,7 +4705,7 @@
           <a:p>
             <a:fld id="{88EC1668-57D9-433B-B282-7BE283FD0F28}" type="datetimeFigureOut">
               <a:rPr lang="en-IN" smtClean="0"/>
-              <a:t>12-01-2022</a:t>
+              <a:t>17-01-2022</a:t>
             </a:fld>
             <a:endParaRPr lang="en-IN"/>
           </a:p>
@@ -5044,7 +5050,7 @@
           <a:p>
             <a:fld id="{88EC1668-57D9-433B-B282-7BE283FD0F28}" type="datetimeFigureOut">
               <a:rPr lang="en-IN" smtClean="0"/>
-              <a:t>12-01-2022</a:t>
+              <a:t>17-01-2022</a:t>
             </a:fld>
             <a:endParaRPr lang="en-IN"/>
           </a:p>
@@ -7161,7 +7167,7 @@
           <a:p>
             <a:fld id="{88EC1668-57D9-433B-B282-7BE283FD0F28}" type="datetimeFigureOut">
               <a:rPr lang="en-IN" smtClean="0"/>
-              <a:t>12-01-2022</a:t>
+              <a:t>17-01-2022</a:t>
             </a:fld>
             <a:endParaRPr lang="en-IN"/>
           </a:p>
@@ -7753,6 +7759,108 @@
 </p:sld>
 </file>
 
+<file path=ppt/slides/slide10.xml><?xml version="1.0" encoding="utf-8"?>
+<p:sld xmlns:a="http://schemas.openxmlformats.org/drawingml/2006/main" xmlns:r="http://schemas.openxmlformats.org/officeDocument/2006/relationships" xmlns:p="http://schemas.openxmlformats.org/presentationml/2006/main">
+  <p:cSld>
+    <p:spTree>
+      <p:nvGrpSpPr>
+        <p:cNvPr id="1" name=""/>
+        <p:cNvGrpSpPr/>
+        <p:nvPr/>
+      </p:nvGrpSpPr>
+      <p:grpSpPr>
+        <a:xfrm>
+          <a:off x="0" y="0"/>
+          <a:ext cx="0" cy="0"/>
+          <a:chOff x="0" y="0"/>
+          <a:chExt cx="0" cy="0"/>
+        </a:xfrm>
+      </p:grpSpPr>
+      <p:sp>
+        <p:nvSpPr>
+          <p:cNvPr id="2" name="Title 1"/>
+          <p:cNvSpPr>
+            <a:spLocks noGrp="1"/>
+          </p:cNvSpPr>
+          <p:nvPr>
+            <p:ph type="title"/>
+          </p:nvPr>
+        </p:nvSpPr>
+        <p:spPr/>
+        <p:txBody>
+          <a:bodyPr/>
+          <a:lstStyle/>
+          <a:p>
+            <a:r>
+              <a:rPr lang="en-US" dirty="0" smtClean="0"/>
+              <a:t>References</a:t>
+            </a:r>
+            <a:endParaRPr lang="en-IN" dirty="0"/>
+          </a:p>
+        </p:txBody>
+      </p:sp>
+      <p:sp>
+        <p:nvSpPr>
+          <p:cNvPr id="3" name="Content Placeholder 2"/>
+          <p:cNvSpPr>
+            <a:spLocks noGrp="1"/>
+          </p:cNvSpPr>
+          <p:nvPr>
+            <p:ph idx="1"/>
+          </p:nvPr>
+        </p:nvSpPr>
+        <p:spPr/>
+        <p:txBody>
+          <a:bodyPr/>
+          <a:lstStyle/>
+          <a:p>
+            <a:r>
+              <a:rPr lang="en-IN" dirty="0">
+                <a:hlinkClick r:id="rId2"/>
+              </a:rPr>
+              <a:t>https://</a:t>
+            </a:r>
+            <a:r>
+              <a:rPr lang="en-IN" dirty="0" smtClean="0">
+                <a:hlinkClick r:id="rId2"/>
+              </a:rPr>
+              <a:t>www.tutorialspoint.com/mongodb/index.htm</a:t>
+            </a:r>
+            <a:endParaRPr lang="en-IN" dirty="0" smtClean="0"/>
+          </a:p>
+          <a:p>
+            <a:r>
+              <a:rPr lang="en-IN" dirty="0">
+                <a:hlinkClick r:id="rId3"/>
+              </a:rPr>
+              <a:t>https://docs.mongodb.com/manual/introduction</a:t>
+            </a:r>
+            <a:r>
+              <a:rPr lang="en-IN" dirty="0" smtClean="0">
+                <a:hlinkClick r:id="rId3"/>
+              </a:rPr>
+              <a:t>/</a:t>
+            </a:r>
+            <a:endParaRPr lang="en-IN" dirty="0" smtClean="0"/>
+          </a:p>
+          <a:p>
+            <a:endParaRPr lang="en-IN" dirty="0"/>
+          </a:p>
+        </p:txBody>
+      </p:sp>
+    </p:spTree>
+    <p:extLst>
+      <p:ext uri="{BB962C8B-B14F-4D97-AF65-F5344CB8AC3E}">
+        <p14:creationId xmlns:p14="http://schemas.microsoft.com/office/powerpoint/2010/main" val="2323719451"/>
+      </p:ext>
+    </p:extLst>
+  </p:cSld>
+  <p:clrMapOvr>
+    <a:masterClrMapping/>
+  </p:clrMapOvr>
+</p:sld>
+</file>
+
 <file path=ppt/slides/slide2.xml><?xml version="1.0" encoding="utf-8"?>
 <p:sld xmlns:a="http://schemas.openxmlformats.org/drawingml/2006/main" xmlns:r="http://schemas.openxmlformats.org/officeDocument/2006/relationships" xmlns:p="http://schemas.openxmlformats.org/presentationml/2006/main">
   <p:cSld>
@@ -8576,7 +8684,7 @@
           <a:p>
             <a:r>
               <a:rPr lang="en-US" dirty="0" smtClean="0"/>
-              <a:t>References</a:t>
+              <a:t>Installation steps</a:t>
             </a:r>
             <a:endParaRPr lang="en-IN" dirty="0"/>
           </a:p>
@@ -8597,36 +8705,107 @@
           <a:bodyPr/>
           <a:lstStyle/>
           <a:p>
+            <a:r>
+              <a:rPr lang="en-IN" dirty="0"/>
+              <a:t>1. Download and install </a:t>
+            </a:r>
+            <a:r>
+              <a:rPr lang="en-IN" dirty="0" err="1"/>
+              <a:t>mongodb</a:t>
+            </a:r>
+            <a:r>
+              <a:rPr lang="en-IN" dirty="0"/>
+              <a:t/>
+            </a:r>
+            <a:br>
+              <a:rPr lang="en-IN" dirty="0"/>
+            </a:br>
+            <a:r>
+              <a:rPr lang="en-IN" dirty="0" err="1"/>
+              <a:t>url</a:t>
+            </a:r>
+            <a:r>
+              <a:rPr lang="en-IN" dirty="0"/>
+              <a:t> : </a:t>
+            </a:r>
             <a:r>
               <a:rPr lang="en-IN" dirty="0">
                 <a:hlinkClick r:id="rId2"/>
               </a:rPr>
-              <a:t>https://</a:t>
-            </a:r>
-            <a:r>
-              <a:rPr lang="en-IN" dirty="0" smtClean="0">
-                <a:hlinkClick r:id="rId2"/>
-              </a:rPr>
-              <a:t>www.tutorialspoint.com/mongodb/index.htm</a:t>
-            </a:r>
-            <a:endParaRPr lang="en-IN" dirty="0" smtClean="0"/>
-          </a:p>
-          <a:p>
+              <a:t>https://www.mongodb.com/try/download/community</a:t>
+            </a:r>
+            <a:r>
+              <a:rPr lang="en-IN" dirty="0"/>
+              <a:t/>
+            </a:r>
+            <a:br>
+              <a:rPr lang="en-IN" dirty="0"/>
+            </a:br>
+            <a:r>
+              <a:rPr lang="en-IN" dirty="0"/>
+              <a:t/>
+            </a:r>
+            <a:br>
+              <a:rPr lang="en-IN" dirty="0"/>
+            </a:br>
+            <a:r>
+              <a:rPr lang="en-IN" dirty="0"/>
+              <a:t>2. After installation add Environment </a:t>
+            </a:r>
+            <a:r>
+              <a:rPr lang="en-IN" dirty="0" smtClean="0"/>
+              <a:t>Path (Optional)</a:t>
+            </a:r>
+            <a:r>
+              <a:rPr lang="en-IN" dirty="0"/>
+              <a:t/>
+            </a:r>
+            <a:br>
+              <a:rPr lang="en-IN" dirty="0"/>
+            </a:br>
+            <a:r>
+              <a:rPr lang="en-IN" dirty="0"/>
+              <a:t>C:\Program Files\MongoDB\Server\5.0\bin</a:t>
+            </a:r>
+            <a:r>
+              <a:rPr lang="en-IN" dirty="0"/>
+              <a:t/>
+            </a:r>
+            <a:br>
+              <a:rPr lang="en-IN" dirty="0"/>
+            </a:br>
+            <a:r>
+              <a:rPr lang="en-IN" dirty="0"/>
+              <a:t/>
+            </a:r>
+            <a:br>
+              <a:rPr lang="en-IN" dirty="0"/>
+            </a:br>
+            <a:r>
+              <a:rPr lang="en-IN" dirty="0"/>
+              <a:t>3. Install Robo3T</a:t>
+            </a:r>
+            <a:r>
+              <a:rPr lang="en-IN" dirty="0"/>
+              <a:t/>
+            </a:r>
+            <a:br>
+              <a:rPr lang="en-IN" dirty="0"/>
+            </a:br>
+            <a:r>
+              <a:rPr lang="en-IN" dirty="0" err="1"/>
+              <a:t>url</a:t>
+            </a:r>
+            <a:r>
+              <a:rPr lang="en-IN" dirty="0"/>
+              <a:t> : </a:t>
+            </a:r>
             <a:r>
               <a:rPr lang="en-IN" dirty="0">
                 <a:hlinkClick r:id="rId3"/>
               </a:rPr>
-              <a:t>https://docs.mongodb.com/manual/introduction</a:t>
-            </a:r>
-            <a:r>
-              <a:rPr lang="en-IN" dirty="0" smtClean="0">
-                <a:hlinkClick r:id="rId3"/>
-              </a:rPr>
-              <a:t>/</a:t>
-            </a:r>
-            <a:endParaRPr lang="en-IN" dirty="0" smtClean="0"/>
-          </a:p>
-          <a:p>
+              <a:t>https://robomongo.org/</a:t>
+            </a:r>
             <a:endParaRPr lang="en-IN" dirty="0"/>
           </a:p>
         </p:txBody>
@@ -8634,7 +8813,7 @@
     </p:spTree>
     <p:extLst>
       <p:ext uri="{BB962C8B-B14F-4D97-AF65-F5344CB8AC3E}">
-        <p14:creationId xmlns:p14="http://schemas.microsoft.com/office/powerpoint/2010/main" val="2323719451"/>
+        <p14:creationId xmlns:p14="http://schemas.microsoft.com/office/powerpoint/2010/main" val="3700626051"/>
       </p:ext>
     </p:extLst>
   </p:cSld>

</xml_diff>

<commit_message>
Mongodb: test files added
</commit_message>
<xml_diff>
--- a/Mongodb/MongoDb_Class1.pptx
+++ b/Mongodb/MongoDb_Class1.pptx
@@ -8,13 +8,15 @@
     <p:sldId id="256" r:id="rId2"/>
     <p:sldId id="257" r:id="rId3"/>
     <p:sldId id="264" r:id="rId4"/>
-    <p:sldId id="258" r:id="rId5"/>
-    <p:sldId id="259" r:id="rId6"/>
-    <p:sldId id="260" r:id="rId7"/>
-    <p:sldId id="261" r:id="rId8"/>
-    <p:sldId id="262" r:id="rId9"/>
-    <p:sldId id="265" r:id="rId10"/>
-    <p:sldId id="263" r:id="rId11"/>
+    <p:sldId id="266" r:id="rId5"/>
+    <p:sldId id="267" r:id="rId6"/>
+    <p:sldId id="258" r:id="rId7"/>
+    <p:sldId id="259" r:id="rId8"/>
+    <p:sldId id="260" r:id="rId9"/>
+    <p:sldId id="261" r:id="rId10"/>
+    <p:sldId id="262" r:id="rId11"/>
+    <p:sldId id="265" r:id="rId12"/>
+    <p:sldId id="263" r:id="rId13"/>
   </p:sldIdLst>
   <p:sldSz cx="12192000" cy="6858000"/>
   <p:notesSz cx="6858000" cy="9144000"/>
@@ -7792,6 +7794,261 @@
           <a:lstStyle/>
           <a:p>
             <a:r>
+              <a:rPr lang="en-IN" dirty="0"/>
+              <a:t>Sample Document</a:t>
+            </a:r>
+            <a:br>
+              <a:rPr lang="en-IN" dirty="0"/>
+            </a:br>
+            <a:endParaRPr lang="en-IN" dirty="0"/>
+          </a:p>
+        </p:txBody>
+      </p:sp>
+      <p:pic>
+        <p:nvPicPr>
+          <p:cNvPr id="4" name="Content Placeholder 3"/>
+          <p:cNvPicPr>
+            <a:picLocks noGrp="1" noChangeAspect="1"/>
+          </p:cNvPicPr>
+          <p:nvPr>
+            <p:ph idx="1"/>
+          </p:nvPr>
+        </p:nvPicPr>
+        <p:blipFill>
+          <a:blip r:embed="rId2"/>
+          <a:stretch>
+            <a:fillRect/>
+          </a:stretch>
+        </p:blipFill>
+        <p:spPr>
+          <a:xfrm>
+            <a:off x="2592925" y="1334336"/>
+            <a:ext cx="7831570" cy="5523664"/>
+          </a:xfrm>
+          <a:prstGeom prst="rect">
+            <a:avLst/>
+          </a:prstGeom>
+        </p:spPr>
+      </p:pic>
+    </p:spTree>
+    <p:extLst>
+      <p:ext uri="{BB962C8B-B14F-4D97-AF65-F5344CB8AC3E}">
+        <p14:creationId xmlns:p14="http://schemas.microsoft.com/office/powerpoint/2010/main" val="1484600733"/>
+      </p:ext>
+    </p:extLst>
+  </p:cSld>
+  <p:clrMapOvr>
+    <a:masterClrMapping/>
+  </p:clrMapOvr>
+</p:sld>
+</file>
+
+<file path=ppt/slides/slide11.xml><?xml version="1.0" encoding="utf-8"?>
+<p:sld xmlns:a="http://schemas.openxmlformats.org/drawingml/2006/main" xmlns:r="http://schemas.openxmlformats.org/officeDocument/2006/relationships" xmlns:p="http://schemas.openxmlformats.org/presentationml/2006/main">
+  <p:cSld>
+    <p:spTree>
+      <p:nvGrpSpPr>
+        <p:cNvPr id="1" name=""/>
+        <p:cNvGrpSpPr/>
+        <p:nvPr/>
+      </p:nvGrpSpPr>
+      <p:grpSpPr>
+        <a:xfrm>
+          <a:off x="0" y="0"/>
+          <a:ext cx="0" cy="0"/>
+          <a:chOff x="0" y="0"/>
+          <a:chExt cx="0" cy="0"/>
+        </a:xfrm>
+      </p:grpSpPr>
+      <p:sp>
+        <p:nvSpPr>
+          <p:cNvPr id="2" name="Title 1"/>
+          <p:cNvSpPr>
+            <a:spLocks noGrp="1"/>
+          </p:cNvSpPr>
+          <p:nvPr>
+            <p:ph type="title"/>
+          </p:nvPr>
+        </p:nvSpPr>
+        <p:spPr/>
+        <p:txBody>
+          <a:bodyPr/>
+          <a:lstStyle/>
+          <a:p>
+            <a:r>
+              <a:rPr lang="en-US" dirty="0" smtClean="0"/>
+              <a:t>Installation steps</a:t>
+            </a:r>
+            <a:endParaRPr lang="en-IN" dirty="0"/>
+          </a:p>
+        </p:txBody>
+      </p:sp>
+      <p:sp>
+        <p:nvSpPr>
+          <p:cNvPr id="3" name="Content Placeholder 2"/>
+          <p:cNvSpPr>
+            <a:spLocks noGrp="1"/>
+          </p:cNvSpPr>
+          <p:nvPr>
+            <p:ph idx="1"/>
+          </p:nvPr>
+        </p:nvSpPr>
+        <p:spPr/>
+        <p:txBody>
+          <a:bodyPr/>
+          <a:lstStyle/>
+          <a:p>
+            <a:r>
+              <a:rPr lang="en-IN" dirty="0"/>
+              <a:t>1. Download and install </a:t>
+            </a:r>
+            <a:r>
+              <a:rPr lang="en-IN" dirty="0" err="1"/>
+              <a:t>mongodb</a:t>
+            </a:r>
+            <a:r>
+              <a:rPr lang="en-IN" dirty="0"/>
+              <a:t/>
+            </a:r>
+            <a:br>
+              <a:rPr lang="en-IN" dirty="0"/>
+            </a:br>
+            <a:r>
+              <a:rPr lang="en-IN" dirty="0" err="1"/>
+              <a:t>url</a:t>
+            </a:r>
+            <a:r>
+              <a:rPr lang="en-IN" dirty="0"/>
+              <a:t> : </a:t>
+            </a:r>
+            <a:r>
+              <a:rPr lang="en-IN" dirty="0">
+                <a:hlinkClick r:id="rId2"/>
+              </a:rPr>
+              <a:t>https://www.mongodb.com/try/download/community</a:t>
+            </a:r>
+            <a:r>
+              <a:rPr lang="en-IN" dirty="0"/>
+              <a:t/>
+            </a:r>
+            <a:br>
+              <a:rPr lang="en-IN" dirty="0"/>
+            </a:br>
+            <a:r>
+              <a:rPr lang="en-IN" dirty="0"/>
+              <a:t/>
+            </a:r>
+            <a:br>
+              <a:rPr lang="en-IN" dirty="0"/>
+            </a:br>
+            <a:r>
+              <a:rPr lang="en-IN" dirty="0"/>
+              <a:t>2. After installation add Environment </a:t>
+            </a:r>
+            <a:r>
+              <a:rPr lang="en-IN" dirty="0" smtClean="0"/>
+              <a:t>Path (Optional)</a:t>
+            </a:r>
+            <a:r>
+              <a:rPr lang="en-IN" dirty="0"/>
+              <a:t/>
+            </a:r>
+            <a:br>
+              <a:rPr lang="en-IN" dirty="0"/>
+            </a:br>
+            <a:r>
+              <a:rPr lang="en-IN" dirty="0"/>
+              <a:t>C:\Program Files\MongoDB\Server\5.0\bin</a:t>
+            </a:r>
+            <a:r>
+              <a:rPr lang="en-IN" dirty="0"/>
+              <a:t/>
+            </a:r>
+            <a:br>
+              <a:rPr lang="en-IN" dirty="0"/>
+            </a:br>
+            <a:r>
+              <a:rPr lang="en-IN" dirty="0"/>
+              <a:t/>
+            </a:r>
+            <a:br>
+              <a:rPr lang="en-IN" dirty="0"/>
+            </a:br>
+            <a:r>
+              <a:rPr lang="en-IN" dirty="0"/>
+              <a:t>3. Install Robo3T</a:t>
+            </a:r>
+            <a:r>
+              <a:rPr lang="en-IN" dirty="0"/>
+              <a:t/>
+            </a:r>
+            <a:br>
+              <a:rPr lang="en-IN" dirty="0"/>
+            </a:br>
+            <a:r>
+              <a:rPr lang="en-IN" dirty="0" err="1"/>
+              <a:t>url</a:t>
+            </a:r>
+            <a:r>
+              <a:rPr lang="en-IN" dirty="0"/>
+              <a:t> : </a:t>
+            </a:r>
+            <a:r>
+              <a:rPr lang="en-IN" dirty="0">
+                <a:hlinkClick r:id="rId3"/>
+              </a:rPr>
+              <a:t>https://robomongo.org/</a:t>
+            </a:r>
+            <a:endParaRPr lang="en-IN" dirty="0"/>
+          </a:p>
+        </p:txBody>
+      </p:sp>
+    </p:spTree>
+    <p:extLst>
+      <p:ext uri="{BB962C8B-B14F-4D97-AF65-F5344CB8AC3E}">
+        <p14:creationId xmlns:p14="http://schemas.microsoft.com/office/powerpoint/2010/main" val="3700626051"/>
+      </p:ext>
+    </p:extLst>
+  </p:cSld>
+  <p:clrMapOvr>
+    <a:masterClrMapping/>
+  </p:clrMapOvr>
+</p:sld>
+</file>
+
+<file path=ppt/slides/slide12.xml><?xml version="1.0" encoding="utf-8"?>
+<p:sld xmlns:a="http://schemas.openxmlformats.org/drawingml/2006/main" xmlns:r="http://schemas.openxmlformats.org/officeDocument/2006/relationships" xmlns:p="http://schemas.openxmlformats.org/presentationml/2006/main">
+  <p:cSld>
+    <p:spTree>
+      <p:nvGrpSpPr>
+        <p:cNvPr id="1" name=""/>
+        <p:cNvGrpSpPr/>
+        <p:nvPr/>
+      </p:nvGrpSpPr>
+      <p:grpSpPr>
+        <a:xfrm>
+          <a:off x="0" y="0"/>
+          <a:ext cx="0" cy="0"/>
+          <a:chOff x="0" y="0"/>
+          <a:chExt cx="0" cy="0"/>
+        </a:xfrm>
+      </p:grpSpPr>
+      <p:sp>
+        <p:nvSpPr>
+          <p:cNvPr id="2" name="Title 1"/>
+          <p:cNvSpPr>
+            <a:spLocks noGrp="1"/>
+          </p:cNvSpPr>
+          <p:nvPr>
+            <p:ph type="title"/>
+          </p:nvPr>
+        </p:nvSpPr>
+        <p:spPr/>
+        <p:txBody>
+          <a:bodyPr/>
+          <a:lstStyle/>
+          <a:p>
+            <a:r>
               <a:rPr lang="en-US" dirty="0" smtClean="0"/>
               <a:t>References</a:t>
             </a:r>
@@ -8102,15 +8359,7 @@
           <a:p>
             <a:r>
               <a:rPr lang="en-US" dirty="0" smtClean="0"/>
-              <a:t>What is </a:t>
-            </a:r>
-            <a:r>
-              <a:rPr lang="en-US" dirty="0" err="1" smtClean="0"/>
-              <a:t>MongoDb</a:t>
-            </a:r>
-            <a:r>
-              <a:rPr lang="en-US" dirty="0" smtClean="0"/>
-              <a:t>?</a:t>
+              <a:t>Advantages</a:t>
             </a:r>
             <a:endParaRPr lang="en-IN" dirty="0"/>
           </a:p>
@@ -8132,58 +8381,32 @@
           <a:lstStyle/>
           <a:p>
             <a:r>
-              <a:rPr lang="en-US" dirty="0"/>
-              <a:t>MongoDB is a </a:t>
-            </a:r>
-            <a:r>
               <a:rPr lang="en-US" dirty="0" smtClean="0"/>
-              <a:t>cross-platform</a:t>
+              <a:t>Insertion and Retrieve Data is easy</a:t>
             </a:r>
           </a:p>
           <a:p>
             <a:r>
               <a:rPr lang="en-US" dirty="0" smtClean="0"/>
-              <a:t> </a:t>
-            </a:r>
-            <a:r>
-              <a:rPr lang="en-US" dirty="0"/>
-              <a:t>document oriented </a:t>
+              <a:t>Schema is flexible(easily </a:t>
+            </a:r>
+            <a:r>
+              <a:rPr lang="en-US" dirty="0" err="1" smtClean="0"/>
+              <a:t>changeble</a:t>
             </a:r>
             <a:r>
               <a:rPr lang="en-US" dirty="0" smtClean="0"/>
-              <a:t>database. </a:t>
+              <a:t>). A document contains relevant information only </a:t>
             </a:r>
           </a:p>
           <a:p>
             <a:r>
               <a:rPr lang="en-US" dirty="0" smtClean="0"/>
-              <a:t>MongoDB </a:t>
-            </a:r>
-            <a:r>
-              <a:rPr lang="en-US" dirty="0"/>
-              <a:t>works on concept of collection and document</a:t>
-            </a:r>
-            <a:r>
-              <a:rPr lang="en-US" dirty="0" smtClean="0"/>
-              <a:t>.</a:t>
-            </a:r>
-          </a:p>
-          <a:p>
-            <a:r>
-              <a:rPr lang="en-US" dirty="0" smtClean="0"/>
-              <a:t>It</a:t>
-            </a:r>
-            <a:r>
-              <a:rPr lang="en-US" dirty="0"/>
-              <a:t> </a:t>
-            </a:r>
-            <a:r>
-              <a:rPr lang="en-US" dirty="0" smtClean="0"/>
-              <a:t>provides </a:t>
-            </a:r>
-            <a:r>
-              <a:rPr lang="en-US" dirty="0"/>
-              <a:t>high performance, high availability, and easy scalability</a:t>
+              <a:t>Built for metrics, analysis , aggregation </a:t>
+            </a:r>
+            <a:r>
+              <a:rPr lang="en-US" dirty="0" err="1" smtClean="0"/>
+              <a:t>etc</a:t>
             </a:r>
             <a:endParaRPr lang="en-IN" dirty="0"/>
           </a:p>
@@ -8192,7 +8415,7 @@
     </p:spTree>
     <p:extLst>
       <p:ext uri="{BB962C8B-B14F-4D97-AF65-F5344CB8AC3E}">
-        <p14:creationId xmlns:p14="http://schemas.microsoft.com/office/powerpoint/2010/main" val="2550590008"/>
+        <p14:creationId xmlns:p14="http://schemas.microsoft.com/office/powerpoint/2010/main" val="577582333"/>
       </p:ext>
     </p:extLst>
   </p:cSld>
@@ -8229,6 +8452,264 @@
             <p:ph type="title"/>
           </p:nvPr>
         </p:nvSpPr>
+        <p:spPr/>
+        <p:txBody>
+          <a:bodyPr/>
+          <a:lstStyle/>
+          <a:p>
+            <a:r>
+              <a:rPr lang="en-US" dirty="0" smtClean="0"/>
+              <a:t>Disadvantages</a:t>
+            </a:r>
+            <a:endParaRPr lang="en-IN" dirty="0"/>
+          </a:p>
+        </p:txBody>
+      </p:sp>
+      <p:sp>
+        <p:nvSpPr>
+          <p:cNvPr id="3" name="Content Placeholder 2"/>
+          <p:cNvSpPr>
+            <a:spLocks noGrp="1"/>
+          </p:cNvSpPr>
+          <p:nvPr>
+            <p:ph idx="1"/>
+          </p:nvPr>
+        </p:nvSpPr>
+        <p:spPr/>
+        <p:txBody>
+          <a:bodyPr/>
+          <a:lstStyle/>
+          <a:p>
+            <a:r>
+              <a:rPr lang="en-US" dirty="0" smtClean="0"/>
+              <a:t>Not built for updates</a:t>
+            </a:r>
+          </a:p>
+          <a:p>
+            <a:r>
+              <a:rPr lang="en-US" dirty="0" smtClean="0"/>
+              <a:t>No Transactions (Financial systems don’t used </a:t>
+            </a:r>
+            <a:r>
+              <a:rPr lang="en-US" dirty="0" err="1" smtClean="0"/>
+              <a:t>nosql</a:t>
+            </a:r>
+            <a:r>
+              <a:rPr lang="en-US" dirty="0" smtClean="0"/>
+              <a:t> for their transactions)</a:t>
+            </a:r>
+          </a:p>
+          <a:p>
+            <a:r>
+              <a:rPr lang="en-US" dirty="0" smtClean="0"/>
+              <a:t>Read Times are slower.(Reading a particular field like “age” or “salary” in a document)</a:t>
+            </a:r>
+          </a:p>
+          <a:p>
+            <a:r>
+              <a:rPr lang="en-US" dirty="0" smtClean="0"/>
+              <a:t>Relations are not implicit.(There is no relation like </a:t>
+            </a:r>
+            <a:r>
+              <a:rPr lang="en-US" dirty="0" err="1" smtClean="0"/>
+              <a:t>fk</a:t>
+            </a:r>
+            <a:r>
+              <a:rPr lang="en-US" dirty="0" smtClean="0"/>
+              <a:t> relation in </a:t>
+            </a:r>
+            <a:r>
+              <a:rPr lang="en-US" dirty="0" err="1" smtClean="0"/>
+              <a:t>mongodb</a:t>
+            </a:r>
+            <a:r>
+              <a:rPr lang="en-US" dirty="0" smtClean="0"/>
+              <a:t>)</a:t>
+            </a:r>
+          </a:p>
+          <a:p>
+            <a:r>
+              <a:rPr lang="en-US" dirty="0" smtClean="0"/>
+              <a:t>Joins are hard </a:t>
+            </a:r>
+            <a:endParaRPr lang="en-IN" dirty="0"/>
+          </a:p>
+        </p:txBody>
+      </p:sp>
+    </p:spTree>
+    <p:extLst>
+      <p:ext uri="{BB962C8B-B14F-4D97-AF65-F5344CB8AC3E}">
+        <p14:creationId xmlns:p14="http://schemas.microsoft.com/office/powerpoint/2010/main" val="2134996527"/>
+      </p:ext>
+    </p:extLst>
+  </p:cSld>
+  <p:clrMapOvr>
+    <a:masterClrMapping/>
+  </p:clrMapOvr>
+</p:sld>
+</file>
+
+<file path=ppt/slides/slide6.xml><?xml version="1.0" encoding="utf-8"?>
+<p:sld xmlns:a="http://schemas.openxmlformats.org/drawingml/2006/main" xmlns:r="http://schemas.openxmlformats.org/officeDocument/2006/relationships" xmlns:p="http://schemas.openxmlformats.org/presentationml/2006/main">
+  <p:cSld>
+    <p:spTree>
+      <p:nvGrpSpPr>
+        <p:cNvPr id="1" name=""/>
+        <p:cNvGrpSpPr/>
+        <p:nvPr/>
+      </p:nvGrpSpPr>
+      <p:grpSpPr>
+        <a:xfrm>
+          <a:off x="0" y="0"/>
+          <a:ext cx="0" cy="0"/>
+          <a:chOff x="0" y="0"/>
+          <a:chExt cx="0" cy="0"/>
+        </a:xfrm>
+      </p:grpSpPr>
+      <p:sp>
+        <p:nvSpPr>
+          <p:cNvPr id="2" name="Title 1"/>
+          <p:cNvSpPr>
+            <a:spLocks noGrp="1"/>
+          </p:cNvSpPr>
+          <p:nvPr>
+            <p:ph type="title"/>
+          </p:nvPr>
+        </p:nvSpPr>
+        <p:spPr/>
+        <p:txBody>
+          <a:bodyPr/>
+          <a:lstStyle/>
+          <a:p>
+            <a:r>
+              <a:rPr lang="en-US" dirty="0" smtClean="0"/>
+              <a:t>What is </a:t>
+            </a:r>
+            <a:r>
+              <a:rPr lang="en-US" dirty="0" err="1" smtClean="0"/>
+              <a:t>MongoDb</a:t>
+            </a:r>
+            <a:r>
+              <a:rPr lang="en-US" dirty="0" smtClean="0"/>
+              <a:t>?</a:t>
+            </a:r>
+            <a:endParaRPr lang="en-IN" dirty="0"/>
+          </a:p>
+        </p:txBody>
+      </p:sp>
+      <p:sp>
+        <p:nvSpPr>
+          <p:cNvPr id="3" name="Content Placeholder 2"/>
+          <p:cNvSpPr>
+            <a:spLocks noGrp="1"/>
+          </p:cNvSpPr>
+          <p:nvPr>
+            <p:ph idx="1"/>
+          </p:nvPr>
+        </p:nvSpPr>
+        <p:spPr/>
+        <p:txBody>
+          <a:bodyPr/>
+          <a:lstStyle/>
+          <a:p>
+            <a:r>
+              <a:rPr lang="en-US" dirty="0"/>
+              <a:t>MongoDB is a </a:t>
+            </a:r>
+            <a:r>
+              <a:rPr lang="en-US" dirty="0" smtClean="0"/>
+              <a:t>cross-platform</a:t>
+            </a:r>
+          </a:p>
+          <a:p>
+            <a:r>
+              <a:rPr lang="en-US" dirty="0" smtClean="0"/>
+              <a:t> </a:t>
+            </a:r>
+            <a:r>
+              <a:rPr lang="en-US" dirty="0"/>
+              <a:t>document oriented </a:t>
+            </a:r>
+            <a:r>
+              <a:rPr lang="en-US" dirty="0" smtClean="0"/>
+              <a:t>database. </a:t>
+            </a:r>
+          </a:p>
+          <a:p>
+            <a:r>
+              <a:rPr lang="en-US" dirty="0" smtClean="0"/>
+              <a:t>MongoDB </a:t>
+            </a:r>
+            <a:r>
+              <a:rPr lang="en-US" dirty="0"/>
+              <a:t>works on concept of collection and document</a:t>
+            </a:r>
+            <a:r>
+              <a:rPr lang="en-US" dirty="0" smtClean="0"/>
+              <a:t>.</a:t>
+            </a:r>
+          </a:p>
+          <a:p>
+            <a:r>
+              <a:rPr lang="en-US" dirty="0" smtClean="0"/>
+              <a:t>It</a:t>
+            </a:r>
+            <a:r>
+              <a:rPr lang="en-US" dirty="0"/>
+              <a:t> </a:t>
+            </a:r>
+            <a:r>
+              <a:rPr lang="en-US" dirty="0" smtClean="0"/>
+              <a:t>provides </a:t>
+            </a:r>
+            <a:r>
+              <a:rPr lang="en-US" dirty="0"/>
+              <a:t>high performance, high availability, and easy scalability</a:t>
+            </a:r>
+            <a:endParaRPr lang="en-IN" dirty="0"/>
+          </a:p>
+        </p:txBody>
+      </p:sp>
+    </p:spTree>
+    <p:extLst>
+      <p:ext uri="{BB962C8B-B14F-4D97-AF65-F5344CB8AC3E}">
+        <p14:creationId xmlns:p14="http://schemas.microsoft.com/office/powerpoint/2010/main" val="2550590008"/>
+      </p:ext>
+    </p:extLst>
+  </p:cSld>
+  <p:clrMapOvr>
+    <a:masterClrMapping/>
+  </p:clrMapOvr>
+</p:sld>
+</file>
+
+<file path=ppt/slides/slide7.xml><?xml version="1.0" encoding="utf-8"?>
+<p:sld xmlns:a="http://schemas.openxmlformats.org/drawingml/2006/main" xmlns:r="http://schemas.openxmlformats.org/officeDocument/2006/relationships" xmlns:p="http://schemas.openxmlformats.org/presentationml/2006/main">
+  <p:cSld>
+    <p:spTree>
+      <p:nvGrpSpPr>
+        <p:cNvPr id="1" name=""/>
+        <p:cNvGrpSpPr/>
+        <p:nvPr/>
+      </p:nvGrpSpPr>
+      <p:grpSpPr>
+        <a:xfrm>
+          <a:off x="0" y="0"/>
+          <a:ext cx="0" cy="0"/>
+          <a:chOff x="0" y="0"/>
+          <a:chExt cx="0" cy="0"/>
+        </a:xfrm>
+      </p:grpSpPr>
+      <p:sp>
+        <p:nvSpPr>
+          <p:cNvPr id="2" name="Title 1"/>
+          <p:cNvSpPr>
+            <a:spLocks noGrp="1"/>
+          </p:cNvSpPr>
+          <p:nvPr>
+            <p:ph type="title"/>
+          </p:nvPr>
+        </p:nvSpPr>
         <p:spPr>
           <a:xfrm>
             <a:off x="2472852" y="180765"/>
@@ -8427,7 +8908,7 @@
 </p:sld>
 </file>
 
-<file path=ppt/slides/slide6.xml><?xml version="1.0" encoding="utf-8"?>
+<file path=ppt/slides/slide8.xml><?xml version="1.0" encoding="utf-8"?>
 <p:sld xmlns:a="http://schemas.openxmlformats.org/drawingml/2006/main" xmlns:r="http://schemas.openxmlformats.org/officeDocument/2006/relationships" xmlns:p="http://schemas.openxmlformats.org/presentationml/2006/main">
   <p:cSld>
     <p:spTree>
@@ -8481,7 +8962,7 @@
 </p:sld>
 </file>
 
-<file path=ppt/slides/slide7.xml><?xml version="1.0" encoding="utf-8"?>
+<file path=ppt/slides/slide9.xml><?xml version="1.0" encoding="utf-8"?>
 <p:sld xmlns:a="http://schemas.openxmlformats.org/drawingml/2006/main" xmlns:r="http://schemas.openxmlformats.org/officeDocument/2006/relationships" xmlns:p="http://schemas.openxmlformats.org/presentationml/2006/main">
   <p:cSld>
     <p:spTree>
@@ -8559,261 +9040,6 @@
     <p:extLst>
       <p:ext uri="{BB962C8B-B14F-4D97-AF65-F5344CB8AC3E}">
         <p14:creationId xmlns:p14="http://schemas.microsoft.com/office/powerpoint/2010/main" val="136249730"/>
-      </p:ext>
-    </p:extLst>
-  </p:cSld>
-  <p:clrMapOvr>
-    <a:masterClrMapping/>
-  </p:clrMapOvr>
-</p:sld>
-</file>
-
-<file path=ppt/slides/slide8.xml><?xml version="1.0" encoding="utf-8"?>
-<p:sld xmlns:a="http://schemas.openxmlformats.org/drawingml/2006/main" xmlns:r="http://schemas.openxmlformats.org/officeDocument/2006/relationships" xmlns:p="http://schemas.openxmlformats.org/presentationml/2006/main">
-  <p:cSld>
-    <p:spTree>
-      <p:nvGrpSpPr>
-        <p:cNvPr id="1" name=""/>
-        <p:cNvGrpSpPr/>
-        <p:nvPr/>
-      </p:nvGrpSpPr>
-      <p:grpSpPr>
-        <a:xfrm>
-          <a:off x="0" y="0"/>
-          <a:ext cx="0" cy="0"/>
-          <a:chOff x="0" y="0"/>
-          <a:chExt cx="0" cy="0"/>
-        </a:xfrm>
-      </p:grpSpPr>
-      <p:sp>
-        <p:nvSpPr>
-          <p:cNvPr id="2" name="Title 1"/>
-          <p:cNvSpPr>
-            <a:spLocks noGrp="1"/>
-          </p:cNvSpPr>
-          <p:nvPr>
-            <p:ph type="title"/>
-          </p:nvPr>
-        </p:nvSpPr>
-        <p:spPr/>
-        <p:txBody>
-          <a:bodyPr/>
-          <a:lstStyle/>
-          <a:p>
-            <a:r>
-              <a:rPr lang="en-IN" dirty="0"/>
-              <a:t>Sample Document</a:t>
-            </a:r>
-            <a:br>
-              <a:rPr lang="en-IN" dirty="0"/>
-            </a:br>
-            <a:endParaRPr lang="en-IN" dirty="0"/>
-          </a:p>
-        </p:txBody>
-      </p:sp>
-      <p:pic>
-        <p:nvPicPr>
-          <p:cNvPr id="4" name="Content Placeholder 3"/>
-          <p:cNvPicPr>
-            <a:picLocks noGrp="1" noChangeAspect="1"/>
-          </p:cNvPicPr>
-          <p:nvPr>
-            <p:ph idx="1"/>
-          </p:nvPr>
-        </p:nvPicPr>
-        <p:blipFill>
-          <a:blip r:embed="rId2"/>
-          <a:stretch>
-            <a:fillRect/>
-          </a:stretch>
-        </p:blipFill>
-        <p:spPr>
-          <a:xfrm>
-            <a:off x="2592925" y="1334336"/>
-            <a:ext cx="7831570" cy="5523664"/>
-          </a:xfrm>
-          <a:prstGeom prst="rect">
-            <a:avLst/>
-          </a:prstGeom>
-        </p:spPr>
-      </p:pic>
-    </p:spTree>
-    <p:extLst>
-      <p:ext uri="{BB962C8B-B14F-4D97-AF65-F5344CB8AC3E}">
-        <p14:creationId xmlns:p14="http://schemas.microsoft.com/office/powerpoint/2010/main" val="1484600733"/>
-      </p:ext>
-    </p:extLst>
-  </p:cSld>
-  <p:clrMapOvr>
-    <a:masterClrMapping/>
-  </p:clrMapOvr>
-</p:sld>
-</file>
-
-<file path=ppt/slides/slide9.xml><?xml version="1.0" encoding="utf-8"?>
-<p:sld xmlns:a="http://schemas.openxmlformats.org/drawingml/2006/main" xmlns:r="http://schemas.openxmlformats.org/officeDocument/2006/relationships" xmlns:p="http://schemas.openxmlformats.org/presentationml/2006/main">
-  <p:cSld>
-    <p:spTree>
-      <p:nvGrpSpPr>
-        <p:cNvPr id="1" name=""/>
-        <p:cNvGrpSpPr/>
-        <p:nvPr/>
-      </p:nvGrpSpPr>
-      <p:grpSpPr>
-        <a:xfrm>
-          <a:off x="0" y="0"/>
-          <a:ext cx="0" cy="0"/>
-          <a:chOff x="0" y="0"/>
-          <a:chExt cx="0" cy="0"/>
-        </a:xfrm>
-      </p:grpSpPr>
-      <p:sp>
-        <p:nvSpPr>
-          <p:cNvPr id="2" name="Title 1"/>
-          <p:cNvSpPr>
-            <a:spLocks noGrp="1"/>
-          </p:cNvSpPr>
-          <p:nvPr>
-            <p:ph type="title"/>
-          </p:nvPr>
-        </p:nvSpPr>
-        <p:spPr/>
-        <p:txBody>
-          <a:bodyPr/>
-          <a:lstStyle/>
-          <a:p>
-            <a:r>
-              <a:rPr lang="en-US" dirty="0" smtClean="0"/>
-              <a:t>Installation steps</a:t>
-            </a:r>
-            <a:endParaRPr lang="en-IN" dirty="0"/>
-          </a:p>
-        </p:txBody>
-      </p:sp>
-      <p:sp>
-        <p:nvSpPr>
-          <p:cNvPr id="3" name="Content Placeholder 2"/>
-          <p:cNvSpPr>
-            <a:spLocks noGrp="1"/>
-          </p:cNvSpPr>
-          <p:nvPr>
-            <p:ph idx="1"/>
-          </p:nvPr>
-        </p:nvSpPr>
-        <p:spPr/>
-        <p:txBody>
-          <a:bodyPr/>
-          <a:lstStyle/>
-          <a:p>
-            <a:r>
-              <a:rPr lang="en-IN" dirty="0"/>
-              <a:t>1. Download and install </a:t>
-            </a:r>
-            <a:r>
-              <a:rPr lang="en-IN" dirty="0" err="1"/>
-              <a:t>mongodb</a:t>
-            </a:r>
-            <a:r>
-              <a:rPr lang="en-IN" dirty="0"/>
-              <a:t/>
-            </a:r>
-            <a:br>
-              <a:rPr lang="en-IN" dirty="0"/>
-            </a:br>
-            <a:r>
-              <a:rPr lang="en-IN" dirty="0" err="1"/>
-              <a:t>url</a:t>
-            </a:r>
-            <a:r>
-              <a:rPr lang="en-IN" dirty="0"/>
-              <a:t> : </a:t>
-            </a:r>
-            <a:r>
-              <a:rPr lang="en-IN" dirty="0">
-                <a:hlinkClick r:id="rId2"/>
-              </a:rPr>
-              <a:t>https://www.mongodb.com/try/download/community</a:t>
-            </a:r>
-            <a:r>
-              <a:rPr lang="en-IN" dirty="0"/>
-              <a:t/>
-            </a:r>
-            <a:br>
-              <a:rPr lang="en-IN" dirty="0"/>
-            </a:br>
-            <a:r>
-              <a:rPr lang="en-IN" dirty="0"/>
-              <a:t/>
-            </a:r>
-            <a:br>
-              <a:rPr lang="en-IN" dirty="0"/>
-            </a:br>
-            <a:r>
-              <a:rPr lang="en-IN" dirty="0"/>
-              <a:t>2. After installation add Environment </a:t>
-            </a:r>
-            <a:r>
-              <a:rPr lang="en-IN" dirty="0" smtClean="0"/>
-              <a:t>Path (Optional)</a:t>
-            </a:r>
-            <a:r>
-              <a:rPr lang="en-IN" dirty="0"/>
-              <a:t/>
-            </a:r>
-            <a:br>
-              <a:rPr lang="en-IN" dirty="0"/>
-            </a:br>
-            <a:r>
-              <a:rPr lang="en-IN" dirty="0"/>
-              <a:t>C:\Program Files\MongoDB\Server\5.0\bin</a:t>
-            </a:r>
-            <a:r>
-              <a:rPr lang="en-IN" dirty="0"/>
-              <a:t/>
-            </a:r>
-            <a:br>
-              <a:rPr lang="en-IN" dirty="0"/>
-            </a:br>
-            <a:r>
-              <a:rPr lang="en-IN" dirty="0"/>
-              <a:t/>
-            </a:r>
-            <a:br>
-              <a:rPr lang="en-IN" dirty="0"/>
-            </a:br>
-            <a:r>
-              <a:rPr lang="en-IN" dirty="0"/>
-              <a:t>3. Install Robo3T</a:t>
-            </a:r>
-            <a:r>
-              <a:rPr lang="en-IN" dirty="0"/>
-              <a:t/>
-            </a:r>
-            <a:br>
-              <a:rPr lang="en-IN" dirty="0"/>
-            </a:br>
-            <a:r>
-              <a:rPr lang="en-IN" dirty="0" err="1"/>
-              <a:t>url</a:t>
-            </a:r>
-            <a:r>
-              <a:rPr lang="en-IN" dirty="0"/>
-              <a:t> : </a:t>
-            </a:r>
-            <a:r>
-              <a:rPr lang="en-IN" dirty="0">
-                <a:hlinkClick r:id="rId3"/>
-              </a:rPr>
-              <a:t>https://robomongo.org/</a:t>
-            </a:r>
-            <a:endParaRPr lang="en-IN" dirty="0"/>
-          </a:p>
-        </p:txBody>
-      </p:sp>
-    </p:spTree>
-    <p:extLst>
-      <p:ext uri="{BB962C8B-B14F-4D97-AF65-F5344CB8AC3E}">
-        <p14:creationId xmlns:p14="http://schemas.microsoft.com/office/powerpoint/2010/main" val="3700626051"/>
       </p:ext>
     </p:extLst>
   </p:cSld>

</xml_diff>